<commit_message>
updating coordinate system image
</commit_message>
<xml_diff>
--- a/assets/ccordinate_systems.pptx
+++ b/assets/ccordinate_systems.pptx
@@ -5,7 +5,7 @@
     <p:sldMasterId id="2147483648" r:id="rId1"/>
   </p:sldMasterIdLst>
   <p:sldIdLst>
-    <p:sldId id="256" r:id="rId2"/>
+    <p:sldId id="257" r:id="rId2"/>
   </p:sldIdLst>
   <p:sldSz cx="12192000" cy="6858000"/>
   <p:notesSz cx="6858000" cy="9144000"/>
@@ -249,7 +249,7 @@
           <a:p>
             <a:fld id="{D3EB3054-B75A-4BD7-8B3E-8DC0F614FAF3}" type="datetimeFigureOut">
               <a:rPr lang="de-DE" smtClean="0"/>
-              <a:t>15.02.2024</a:t>
+              <a:t>16.02.2024</a:t>
             </a:fld>
             <a:endParaRPr lang="de-DE"/>
           </a:p>
@@ -417,7 +417,7 @@
           <a:p>
             <a:fld id="{D3EB3054-B75A-4BD7-8B3E-8DC0F614FAF3}" type="datetimeFigureOut">
               <a:rPr lang="de-DE" smtClean="0"/>
-              <a:t>15.02.2024</a:t>
+              <a:t>16.02.2024</a:t>
             </a:fld>
             <a:endParaRPr lang="de-DE"/>
           </a:p>
@@ -595,7 +595,7 @@
           <a:p>
             <a:fld id="{D3EB3054-B75A-4BD7-8B3E-8DC0F614FAF3}" type="datetimeFigureOut">
               <a:rPr lang="de-DE" smtClean="0"/>
-              <a:t>15.02.2024</a:t>
+              <a:t>16.02.2024</a:t>
             </a:fld>
             <a:endParaRPr lang="de-DE"/>
           </a:p>
@@ -763,7 +763,7 @@
           <a:p>
             <a:fld id="{D3EB3054-B75A-4BD7-8B3E-8DC0F614FAF3}" type="datetimeFigureOut">
               <a:rPr lang="de-DE" smtClean="0"/>
-              <a:t>15.02.2024</a:t>
+              <a:t>16.02.2024</a:t>
             </a:fld>
             <a:endParaRPr lang="de-DE"/>
           </a:p>
@@ -1008,7 +1008,7 @@
           <a:p>
             <a:fld id="{D3EB3054-B75A-4BD7-8B3E-8DC0F614FAF3}" type="datetimeFigureOut">
               <a:rPr lang="de-DE" smtClean="0"/>
-              <a:t>15.02.2024</a:t>
+              <a:t>16.02.2024</a:t>
             </a:fld>
             <a:endParaRPr lang="de-DE"/>
           </a:p>
@@ -1237,7 +1237,7 @@
           <a:p>
             <a:fld id="{D3EB3054-B75A-4BD7-8B3E-8DC0F614FAF3}" type="datetimeFigureOut">
               <a:rPr lang="de-DE" smtClean="0"/>
-              <a:t>15.02.2024</a:t>
+              <a:t>16.02.2024</a:t>
             </a:fld>
             <a:endParaRPr lang="de-DE"/>
           </a:p>
@@ -1601,7 +1601,7 @@
           <a:p>
             <a:fld id="{D3EB3054-B75A-4BD7-8B3E-8DC0F614FAF3}" type="datetimeFigureOut">
               <a:rPr lang="de-DE" smtClean="0"/>
-              <a:t>15.02.2024</a:t>
+              <a:t>16.02.2024</a:t>
             </a:fld>
             <a:endParaRPr lang="de-DE"/>
           </a:p>
@@ -1718,7 +1718,7 @@
           <a:p>
             <a:fld id="{D3EB3054-B75A-4BD7-8B3E-8DC0F614FAF3}" type="datetimeFigureOut">
               <a:rPr lang="de-DE" smtClean="0"/>
-              <a:t>15.02.2024</a:t>
+              <a:t>16.02.2024</a:t>
             </a:fld>
             <a:endParaRPr lang="de-DE"/>
           </a:p>
@@ -1813,7 +1813,7 @@
           <a:p>
             <a:fld id="{D3EB3054-B75A-4BD7-8B3E-8DC0F614FAF3}" type="datetimeFigureOut">
               <a:rPr lang="de-DE" smtClean="0"/>
-              <a:t>15.02.2024</a:t>
+              <a:t>16.02.2024</a:t>
             </a:fld>
             <a:endParaRPr lang="de-DE"/>
           </a:p>
@@ -2088,7 +2088,7 @@
           <a:p>
             <a:fld id="{D3EB3054-B75A-4BD7-8B3E-8DC0F614FAF3}" type="datetimeFigureOut">
               <a:rPr lang="de-DE" smtClean="0"/>
-              <a:t>15.02.2024</a:t>
+              <a:t>16.02.2024</a:t>
             </a:fld>
             <a:endParaRPr lang="de-DE"/>
           </a:p>
@@ -2340,7 +2340,7 @@
           <a:p>
             <a:fld id="{D3EB3054-B75A-4BD7-8B3E-8DC0F614FAF3}" type="datetimeFigureOut">
               <a:rPr lang="de-DE" smtClean="0"/>
-              <a:t>15.02.2024</a:t>
+              <a:t>16.02.2024</a:t>
             </a:fld>
             <a:endParaRPr lang="de-DE"/>
           </a:p>
@@ -2551,7 +2551,7 @@
           <a:p>
             <a:fld id="{D3EB3054-B75A-4BD7-8B3E-8DC0F614FAF3}" type="datetimeFigureOut">
               <a:rPr lang="de-DE" smtClean="0"/>
-              <a:t>15.02.2024</a:t>
+              <a:t>16.02.2024</a:t>
             </a:fld>
             <a:endParaRPr lang="de-DE"/>
           </a:p>
@@ -2944,7 +2944,13 @@
   <p:cSld>
     <p:spTree>
       <p:nvGrpSpPr>
-        <p:cNvPr id="1" name=""/>
+        <p:cNvPr id="1" name="">
+          <a:extLst>
+            <a:ext uri="{FF2B5EF4-FFF2-40B4-BE49-F238E27FC236}">
+              <a16:creationId xmlns:a16="http://schemas.microsoft.com/office/drawing/2014/main" id="{CF1BE6A2-E046-EECD-8B4B-A27A63DCA4F9}"/>
+            </a:ext>
+          </a:extLst>
+        </p:cNvPr>
         <p:cNvGrpSpPr/>
         <p:nvPr/>
       </p:nvGrpSpPr>
@@ -2958,10 +2964,10 @@
       </p:grpSpPr>
       <p:pic>
         <p:nvPicPr>
-          <p:cNvPr id="4" name="Grafik 3" descr="Ein Bild, das Text, Screenshot, Cartoon, Design enthält.&#10;&#10;Beschreibung automatisch generiert.">
+          <p:cNvPr id="3" name="Picture 2" descr="A computer screen shot of a robot arm&#10;&#10;Description automatically generated">
             <a:extLst>
               <a:ext uri="{FF2B5EF4-FFF2-40B4-BE49-F238E27FC236}">
-                <a16:creationId xmlns:a16="http://schemas.microsoft.com/office/drawing/2014/main" id="{2F5B11D0-3AEB-E1C6-7275-CBFE1D1F1A29}"/>
+                <a16:creationId xmlns:a16="http://schemas.microsoft.com/office/drawing/2014/main" id="{3D34BDA9-FF47-9F2D-C23A-54FEFCF407D8}"/>
               </a:ext>
             </a:extLst>
           </p:cNvPr>
@@ -2971,14 +2977,20 @@
           <p:nvPr/>
         </p:nvPicPr>
         <p:blipFill rotWithShape="1">
-          <a:blip r:embed="rId2"/>
-          <a:srcRect l="15239" t="6299" r="16685" b="13976"/>
+          <a:blip r:embed="rId2">
+            <a:extLst>
+              <a:ext uri="{28A0092B-C50C-407E-A947-70E740481C1C}">
+                <a14:useLocalDpi xmlns:a14="http://schemas.microsoft.com/office/drawing/2010/main" val="0"/>
+              </a:ext>
+            </a:extLst>
+          </a:blip>
+          <a:srcRect l="19369" t="19676" r="12766"/>
           <a:stretch/>
         </p:blipFill>
         <p:spPr>
           <a:xfrm>
-            <a:off x="1385254" y="339574"/>
-            <a:ext cx="8930428" cy="5906445"/>
+            <a:off x="1345342" y="543521"/>
+            <a:ext cx="8955770" cy="5962505"/>
           </a:xfrm>
           <a:prstGeom prst="rect">
             <a:avLst/>
@@ -2990,17 +3002,19 @@
           <p:cNvPr id="5" name="Gerade Verbindung mit Pfeil 4">
             <a:extLst>
               <a:ext uri="{FF2B5EF4-FFF2-40B4-BE49-F238E27FC236}">
-                <a16:creationId xmlns:a16="http://schemas.microsoft.com/office/drawing/2014/main" id="{2D8E1873-52D9-A06C-8040-4288E65515BA}"/>
+                <a16:creationId xmlns:a16="http://schemas.microsoft.com/office/drawing/2014/main" id="{3DDA327B-0148-7F35-5C13-C5D218428A28}"/>
               </a:ext>
             </a:extLst>
           </p:cNvPr>
-          <p:cNvCxnSpPr/>
+          <p:cNvCxnSpPr>
+            <a:cxnSpLocks/>
+          </p:cNvCxnSpPr>
           <p:nvPr/>
         </p:nvCxnSpPr>
         <p:spPr>
-          <a:xfrm>
-            <a:off x="5928167" y="4206433"/>
-            <a:ext cx="7718" cy="817944"/>
+          <a:xfrm flipH="1">
+            <a:off x="5517269" y="3639274"/>
+            <a:ext cx="71370" cy="799561"/>
           </a:xfrm>
           <a:prstGeom prst="straightConnector1">
             <a:avLst/>
@@ -3032,7 +3046,7 @@
           <p:cNvPr id="6" name="Gerade Verbindung mit Pfeil 5">
             <a:extLst>
               <a:ext uri="{FF2B5EF4-FFF2-40B4-BE49-F238E27FC236}">
-                <a16:creationId xmlns:a16="http://schemas.microsoft.com/office/drawing/2014/main" id="{CE00EF76-5CC2-558A-EC5E-74466536EA93}"/>
+                <a16:creationId xmlns:a16="http://schemas.microsoft.com/office/drawing/2014/main" id="{5C420638-31D8-49B7-B125-6890322528D0}"/>
               </a:ext>
             </a:extLst>
           </p:cNvPr>
@@ -3043,7 +3057,7 @@
         </p:nvCxnSpPr>
         <p:spPr>
           <a:xfrm>
-            <a:off x="5928167" y="4177496"/>
+            <a:off x="5588639" y="3610337"/>
             <a:ext cx="933692" cy="7716"/>
           </a:xfrm>
           <a:prstGeom prst="straightConnector1">
@@ -3076,7 +3090,7 @@
           <p:cNvPr id="7" name="Gerade Verbindung mit Pfeil 6">
             <a:extLst>
               <a:ext uri="{FF2B5EF4-FFF2-40B4-BE49-F238E27FC236}">
-                <a16:creationId xmlns:a16="http://schemas.microsoft.com/office/drawing/2014/main" id="{121F0140-960C-48AA-6A08-935339D10C58}"/>
+                <a16:creationId xmlns:a16="http://schemas.microsoft.com/office/drawing/2014/main" id="{5D3DB869-E6F2-1EE1-7516-659421EABC72}"/>
               </a:ext>
             </a:extLst>
           </p:cNvPr>
@@ -3087,7 +3101,7 @@
         </p:nvCxnSpPr>
         <p:spPr>
           <a:xfrm flipV="1">
-            <a:off x="5928169" y="3297820"/>
+            <a:off x="5588641" y="2730661"/>
             <a:ext cx="7717" cy="889322"/>
           </a:xfrm>
           <a:prstGeom prst="straightConnector1">
@@ -3120,7 +3134,7 @@
           <p:cNvPr id="8" name="Textfeld 7">
             <a:extLst>
               <a:ext uri="{FF2B5EF4-FFF2-40B4-BE49-F238E27FC236}">
-                <a16:creationId xmlns:a16="http://schemas.microsoft.com/office/drawing/2014/main" id="{72D91D01-5F47-E85A-244A-A243DFC8BDFF}"/>
+                <a16:creationId xmlns:a16="http://schemas.microsoft.com/office/drawing/2014/main" id="{31674508-4CAE-C1CA-FC42-D18C5A40FACD}"/>
               </a:ext>
             </a:extLst>
           </p:cNvPr>
@@ -3129,7 +3143,7 @@
         </p:nvSpPr>
         <p:spPr>
           <a:xfrm>
-            <a:off x="5642658" y="3202328"/>
+            <a:off x="5303130" y="2635169"/>
             <a:ext cx="405113" cy="369332"/>
           </a:xfrm>
           <a:prstGeom prst="rect">
@@ -3159,7 +3173,7 @@
           <p:cNvPr id="9" name="Textfeld 8">
             <a:extLst>
               <a:ext uri="{FF2B5EF4-FFF2-40B4-BE49-F238E27FC236}">
-                <a16:creationId xmlns:a16="http://schemas.microsoft.com/office/drawing/2014/main" id="{7E7212A8-A0F1-6E7F-0827-BA8726E0398A}"/>
+                <a16:creationId xmlns:a16="http://schemas.microsoft.com/office/drawing/2014/main" id="{5144138A-7192-B9E0-725B-4C7479CE3655}"/>
               </a:ext>
             </a:extLst>
           </p:cNvPr>
@@ -3168,7 +3182,7 @@
         </p:nvSpPr>
         <p:spPr>
           <a:xfrm>
-            <a:off x="6607214" y="4128302"/>
+            <a:off x="6267686" y="3561143"/>
             <a:ext cx="405113" cy="369332"/>
           </a:xfrm>
           <a:prstGeom prst="rect">
@@ -3198,7 +3212,7 @@
           <p:cNvPr id="10" name="Textfeld 9">
             <a:extLst>
               <a:ext uri="{FF2B5EF4-FFF2-40B4-BE49-F238E27FC236}">
-                <a16:creationId xmlns:a16="http://schemas.microsoft.com/office/drawing/2014/main" id="{196FD07C-D191-8D1F-6C18-F0C629A7CBCC}"/>
+                <a16:creationId xmlns:a16="http://schemas.microsoft.com/office/drawing/2014/main" id="{78972947-1992-2202-029A-FC8AA4815440}"/>
               </a:ext>
             </a:extLst>
           </p:cNvPr>
@@ -3207,7 +3221,7 @@
         </p:nvSpPr>
         <p:spPr>
           <a:xfrm>
-            <a:off x="5642658" y="4726328"/>
+            <a:off x="5234398" y="4170790"/>
             <a:ext cx="405113" cy="369332"/>
           </a:xfrm>
           <a:prstGeom prst="rect">
@@ -3237,7 +3251,7 @@
           <p:cNvPr id="11" name="Gerade Verbindung mit Pfeil 10">
             <a:extLst>
               <a:ext uri="{FF2B5EF4-FFF2-40B4-BE49-F238E27FC236}">
-                <a16:creationId xmlns:a16="http://schemas.microsoft.com/office/drawing/2014/main" id="{6EF3E767-A074-4E42-D41F-B15916B407BB}"/>
+                <a16:creationId xmlns:a16="http://schemas.microsoft.com/office/drawing/2014/main" id="{726D55A2-9031-E46C-009A-64CF76A06D83}"/>
               </a:ext>
             </a:extLst>
           </p:cNvPr>
@@ -3248,13 +3262,13 @@
         </p:nvCxnSpPr>
         <p:spPr>
           <a:xfrm flipH="1">
-            <a:off x="7112645" y="3618053"/>
+            <a:off x="6948670" y="3068980"/>
             <a:ext cx="513142" cy="422475"/>
           </a:xfrm>
           <a:prstGeom prst="straightConnector1">
             <a:avLst/>
           </a:prstGeom>
-          <a:ln w="57150">
+          <a:ln w="25400">
             <a:solidFill>
               <a:srgbClr val="FF0000"/>
             </a:solidFill>
@@ -3281,7 +3295,7 @@
           <p:cNvPr id="12" name="Gerade Verbindung mit Pfeil 11">
             <a:extLst>
               <a:ext uri="{FF2B5EF4-FFF2-40B4-BE49-F238E27FC236}">
-                <a16:creationId xmlns:a16="http://schemas.microsoft.com/office/drawing/2014/main" id="{F277890B-DEB7-05EA-5432-6778FFDC0C3D}"/>
+                <a16:creationId xmlns:a16="http://schemas.microsoft.com/office/drawing/2014/main" id="{2FD7CBF3-3A8B-E0E1-7BB0-C2CE2B6AC99D}"/>
               </a:ext>
             </a:extLst>
           </p:cNvPr>
@@ -3292,13 +3306,13 @@
         </p:nvCxnSpPr>
         <p:spPr>
           <a:xfrm flipH="1">
-            <a:off x="7594924" y="3627699"/>
+            <a:off x="7450238" y="3068980"/>
             <a:ext cx="11574" cy="682905"/>
           </a:xfrm>
           <a:prstGeom prst="straightConnector1">
             <a:avLst/>
           </a:prstGeom>
-          <a:ln w="57150">
+          <a:ln w="25400">
             <a:solidFill>
               <a:srgbClr val="0070C0"/>
             </a:solidFill>
@@ -3325,7 +3339,7 @@
           <p:cNvPr id="13" name="Gerade Verbindung mit Pfeil 12">
             <a:extLst>
               <a:ext uri="{FF2B5EF4-FFF2-40B4-BE49-F238E27FC236}">
-                <a16:creationId xmlns:a16="http://schemas.microsoft.com/office/drawing/2014/main" id="{1209FA78-27E8-D872-F4E5-24E67A034761}"/>
+                <a16:creationId xmlns:a16="http://schemas.microsoft.com/office/drawing/2014/main" id="{7CE25C91-9FA4-2EE4-DE2E-07FB88B4E273}"/>
               </a:ext>
             </a:extLst>
           </p:cNvPr>
@@ -3336,13 +3350,13 @@
         </p:nvCxnSpPr>
         <p:spPr>
           <a:xfrm flipH="1" flipV="1">
-            <a:off x="6871504" y="3577542"/>
+            <a:off x="6711388" y="3068980"/>
             <a:ext cx="744637" cy="1929"/>
           </a:xfrm>
           <a:prstGeom prst="straightConnector1">
             <a:avLst/>
           </a:prstGeom>
-          <a:ln w="57150">
+          <a:ln w="25400">
             <a:solidFill>
               <a:srgbClr val="00B050"/>
             </a:solidFill>
@@ -3366,10 +3380,10 @@
       </p:cxnSp>
       <p:sp>
         <p:nvSpPr>
-          <p:cNvPr id="14" name="Textfeld 13">
+          <p:cNvPr id="16" name="Textfeld 15">
             <a:extLst>
               <a:ext uri="{FF2B5EF4-FFF2-40B4-BE49-F238E27FC236}">
-                <a16:creationId xmlns:a16="http://schemas.microsoft.com/office/drawing/2014/main" id="{73E9EEAD-1387-45EA-4042-4297882797B2}"/>
+                <a16:creationId xmlns:a16="http://schemas.microsoft.com/office/drawing/2014/main" id="{63B2641F-F7BC-3FFB-A1CF-3AFEDF8AB388}"/>
               </a:ext>
             </a:extLst>
           </p:cNvPr>
@@ -3378,8 +3392,8 @@
         </p:nvSpPr>
         <p:spPr>
           <a:xfrm>
-            <a:off x="7099138" y="3279493"/>
-            <a:ext cx="1292506" cy="307777"/>
+            <a:off x="7299553" y="3659672"/>
+            <a:ext cx="405113" cy="307777"/>
           </a:xfrm>
           <a:prstGeom prst="rect">
             <a:avLst/>
@@ -3398,17 +3412,18 @@
             <a:pPr algn="l"/>
             <a:r>
               <a:rPr lang="de-DE" sz="1400" b="1" dirty="0"/>
-              <a:t>(0.5,0.5,0.5)</a:t>
-            </a:r>
-          </a:p>
-        </p:txBody>
-      </p:sp>
-      <p:sp>
-        <p:nvSpPr>
-          <p:cNvPr id="15" name="Textfeld 14">
+              <a:t>z</a:t>
+            </a:r>
+            <a:endParaRPr lang="de-DE" b="1" dirty="0"/>
+          </a:p>
+        </p:txBody>
+      </p:sp>
+      <p:sp>
+        <p:nvSpPr>
+          <p:cNvPr id="17" name="Textfeld 16">
             <a:extLst>
               <a:ext uri="{FF2B5EF4-FFF2-40B4-BE49-F238E27FC236}">
-                <a16:creationId xmlns:a16="http://schemas.microsoft.com/office/drawing/2014/main" id="{7B623C6C-7ACF-C262-6345-9692E86800AB}"/>
+                <a16:creationId xmlns:a16="http://schemas.microsoft.com/office/drawing/2014/main" id="{14FFA2F0-7664-C3BA-A495-36A686EA73EA}"/>
               </a:ext>
             </a:extLst>
           </p:cNvPr>
@@ -3417,8 +3432,8 @@
         </p:nvSpPr>
         <p:spPr>
           <a:xfrm>
-            <a:off x="4591289" y="5092860"/>
-            <a:ext cx="1292506" cy="307777"/>
+            <a:off x="6787484" y="3376477"/>
+            <a:ext cx="405113" cy="307777"/>
           </a:xfrm>
           <a:prstGeom prst="rect">
             <a:avLst/>
@@ -3437,17 +3452,18 @@
             <a:pPr algn="l"/>
             <a:r>
               <a:rPr lang="de-DE" sz="1400" b="1" dirty="0"/>
-              <a:t>(-0.2,0.5,0)</a:t>
-            </a:r>
-          </a:p>
-        </p:txBody>
-      </p:sp>
-      <p:sp>
-        <p:nvSpPr>
-          <p:cNvPr id="16" name="Textfeld 15">
+              <a:t>y</a:t>
+            </a:r>
+            <a:endParaRPr lang="de-DE" b="1" dirty="0"/>
+          </a:p>
+        </p:txBody>
+      </p:sp>
+      <p:sp>
+        <p:nvSpPr>
+          <p:cNvPr id="18" name="Textfeld 17">
             <a:extLst>
               <a:ext uri="{FF2B5EF4-FFF2-40B4-BE49-F238E27FC236}">
-                <a16:creationId xmlns:a16="http://schemas.microsoft.com/office/drawing/2014/main" id="{7857B9B5-32F1-C8E6-9EC6-57ADCC1AC0D5}"/>
+                <a16:creationId xmlns:a16="http://schemas.microsoft.com/office/drawing/2014/main" id="{CCA75F2F-472A-6157-6247-76A125467FCC}"/>
               </a:ext>
             </a:extLst>
           </p:cNvPr>
@@ -3456,8 +3472,8 @@
         </p:nvSpPr>
         <p:spPr>
           <a:xfrm>
-            <a:off x="7456025" y="4186176"/>
-            <a:ext cx="405113" cy="369332"/>
+            <a:off x="6495330" y="2926248"/>
+            <a:ext cx="405113" cy="307777"/>
           </a:xfrm>
           <a:prstGeom prst="rect">
             <a:avLst/>
@@ -3475,18 +3491,18 @@
           <a:p>
             <a:pPr algn="l"/>
             <a:r>
-              <a:rPr lang="de-DE" b="1" dirty="0"/>
-              <a:t>z</a:t>
-            </a:r>
-          </a:p>
-        </p:txBody>
-      </p:sp>
-      <p:sp>
-        <p:nvSpPr>
-          <p:cNvPr id="17" name="Textfeld 16">
+              <a:rPr lang="de-DE" sz="1400" b="1" dirty="0"/>
+              <a:t>x</a:t>
+            </a:r>
+          </a:p>
+        </p:txBody>
+      </p:sp>
+      <p:sp>
+        <p:nvSpPr>
+          <p:cNvPr id="19" name="Textfeld 18">
             <a:extLst>
               <a:ext uri="{FF2B5EF4-FFF2-40B4-BE49-F238E27FC236}">
-                <a16:creationId xmlns:a16="http://schemas.microsoft.com/office/drawing/2014/main" id="{C17FEDCA-06CF-83E8-C2E5-90548434FFA7}"/>
+                <a16:creationId xmlns:a16="http://schemas.microsoft.com/office/drawing/2014/main" id="{0DBC4A09-7133-20C5-EB6F-487E5F05439B}"/>
               </a:ext>
             </a:extLst>
           </p:cNvPr>
@@ -3495,86 +3511,8 @@
         </p:nvSpPr>
         <p:spPr>
           <a:xfrm>
-            <a:off x="6674732" y="3395238"/>
-            <a:ext cx="405113" cy="369332"/>
-          </a:xfrm>
-          <a:prstGeom prst="rect">
-            <a:avLst/>
-          </a:prstGeom>
-          <a:noFill/>
-        </p:spPr>
-        <p:txBody>
-          <a:bodyPr rot="0" spcFirstLastPara="0" vertOverflow="overflow" horzOverflow="overflow" vert="horz" wrap="square" lIns="91440" tIns="45720" rIns="91440" bIns="45720" numCol="1" spcCol="0" rtlCol="0" fromWordArt="0" anchor="t" anchorCtr="0" forceAA="0" compatLnSpc="1">
-            <a:prstTxWarp prst="textNoShape">
-              <a:avLst/>
-            </a:prstTxWarp>
-            <a:spAutoFit/>
-          </a:bodyPr>
-          <a:lstStyle/>
-          <a:p>
-            <a:pPr algn="l"/>
-            <a:r>
-              <a:rPr lang="de-DE" b="1" dirty="0"/>
-              <a:t>y</a:t>
-            </a:r>
-          </a:p>
-        </p:txBody>
-      </p:sp>
-      <p:sp>
-        <p:nvSpPr>
-          <p:cNvPr id="18" name="Textfeld 17">
-            <a:extLst>
-              <a:ext uri="{FF2B5EF4-FFF2-40B4-BE49-F238E27FC236}">
-                <a16:creationId xmlns:a16="http://schemas.microsoft.com/office/drawing/2014/main" id="{A11E7FBE-913B-B94D-1F4B-591A1D84188A}"/>
-              </a:ext>
-            </a:extLst>
-          </p:cNvPr>
-          <p:cNvSpPr txBox="1"/>
-          <p:nvPr/>
-        </p:nvSpPr>
-        <p:spPr>
-          <a:xfrm>
-            <a:off x="6925518" y="3896808"/>
-            <a:ext cx="405113" cy="369332"/>
-          </a:xfrm>
-          <a:prstGeom prst="rect">
-            <a:avLst/>
-          </a:prstGeom>
-          <a:noFill/>
-        </p:spPr>
-        <p:txBody>
-          <a:bodyPr rot="0" spcFirstLastPara="0" vertOverflow="overflow" horzOverflow="overflow" vert="horz" wrap="square" lIns="91440" tIns="45720" rIns="91440" bIns="45720" numCol="1" spcCol="0" rtlCol="0" fromWordArt="0" anchor="t" anchorCtr="0" forceAA="0" compatLnSpc="1">
-            <a:prstTxWarp prst="textNoShape">
-              <a:avLst/>
-            </a:prstTxWarp>
-            <a:spAutoFit/>
-          </a:bodyPr>
-          <a:lstStyle/>
-          <a:p>
-            <a:pPr algn="l"/>
-            <a:r>
-              <a:rPr lang="de-DE" b="1" dirty="0"/>
-              <a:t>x</a:t>
-            </a:r>
-          </a:p>
-        </p:txBody>
-      </p:sp>
-      <p:sp>
-        <p:nvSpPr>
-          <p:cNvPr id="19" name="Textfeld 18">
-            <a:extLst>
-              <a:ext uri="{FF2B5EF4-FFF2-40B4-BE49-F238E27FC236}">
-                <a16:creationId xmlns:a16="http://schemas.microsoft.com/office/drawing/2014/main" id="{42224C2D-58E1-9A0E-C79B-E44E1026752A}"/>
-              </a:ext>
-            </a:extLst>
-          </p:cNvPr>
-          <p:cNvSpPr txBox="1"/>
-          <p:nvPr/>
-        </p:nvSpPr>
-        <p:spPr>
-          <a:xfrm>
-            <a:off x="7668228" y="3568861"/>
-            <a:ext cx="2636948" cy="430887"/>
+            <a:off x="7568956" y="2710804"/>
+            <a:ext cx="2550404" cy="430887"/>
           </a:xfrm>
           <a:prstGeom prst="rect">
             <a:avLst/>
@@ -3596,27 +3534,676 @@
           <a:p>
             <a:r>
               <a:rPr lang="de-DE" sz="1100" b="1" dirty="0" err="1"/>
-              <a:t>wxyz-quat</a:t>
+              <a:t>pos</a:t>
             </a:r>
             <a:r>
               <a:rPr lang="de-DE" sz="1100" b="1" dirty="0"/>
-              <a:t>: (0,1,0,0) -&gt; KOS um 180° um x-Achse </a:t>
+              <a:t> = (0.5,0.5,0.5), </a:t>
             </a:r>
             <a:r>
               <a:rPr lang="de-DE" sz="1100" b="1" dirty="0" err="1"/>
-              <a:t>grdreht</a:t>
+              <a:t>quat</a:t>
             </a:r>
             <a:r>
               <a:rPr lang="de-DE" sz="1100" b="1" dirty="0"/>
-              <a:t> </a:t>
-            </a:r>
+              <a:t>: (0,1,0,0) </a:t>
+            </a:r>
+          </a:p>
+          <a:p>
+            <a:r>
+              <a:rPr lang="de-DE" sz="1100" b="1" dirty="0"/>
+              <a:t>-&gt; KOS um 180° um x-Achse gedreht </a:t>
+            </a:r>
+          </a:p>
+        </p:txBody>
+      </p:sp>
+      <p:sp>
+        <p:nvSpPr>
+          <p:cNvPr id="29" name="Freeform: Shape 28">
+            <a:extLst>
+              <a:ext uri="{FF2B5EF4-FFF2-40B4-BE49-F238E27FC236}">
+                <a16:creationId xmlns:a16="http://schemas.microsoft.com/office/drawing/2014/main" id="{E99E9A43-17DC-647C-971D-0BEA137A37D7}"/>
+              </a:ext>
+            </a:extLst>
+          </p:cNvPr>
+          <p:cNvSpPr/>
+          <p:nvPr/>
+        </p:nvSpPr>
+        <p:spPr>
+          <a:xfrm>
+            <a:off x="4754880" y="3575685"/>
+            <a:ext cx="272415" cy="302895"/>
+          </a:xfrm>
+          <a:custGeom>
+            <a:avLst/>
+            <a:gdLst>
+              <a:gd name="connsiteX0" fmla="*/ 272415 w 272415"/>
+              <a:gd name="connsiteY0" fmla="*/ 302895 h 302895"/>
+              <a:gd name="connsiteX1" fmla="*/ 66675 w 272415"/>
+              <a:gd name="connsiteY1" fmla="*/ 171450 h 302895"/>
+              <a:gd name="connsiteX2" fmla="*/ 0 w 272415"/>
+              <a:gd name="connsiteY2" fmla="*/ 0 h 302895"/>
+            </a:gdLst>
+            <a:ahLst/>
+            <a:cxnLst>
+              <a:cxn ang="0">
+                <a:pos x="connsiteX0" y="connsiteY0"/>
+              </a:cxn>
+              <a:cxn ang="0">
+                <a:pos x="connsiteX1" y="connsiteY1"/>
+              </a:cxn>
+              <a:cxn ang="0">
+                <a:pos x="connsiteX2" y="connsiteY2"/>
+              </a:cxn>
+            </a:cxnLst>
+            <a:rect l="l" t="t" r="r" b="b"/>
+            <a:pathLst>
+              <a:path w="272415" h="302895">
+                <a:moveTo>
+                  <a:pt x="272415" y="302895"/>
+                </a:moveTo>
+                <a:cubicBezTo>
+                  <a:pt x="192246" y="262413"/>
+                  <a:pt x="112077" y="221932"/>
+                  <a:pt x="66675" y="171450"/>
+                </a:cubicBezTo>
+                <a:cubicBezTo>
+                  <a:pt x="21273" y="120968"/>
+                  <a:pt x="9207" y="33020"/>
+                  <a:pt x="0" y="0"/>
+                </a:cubicBezTo>
+              </a:path>
+            </a:pathLst>
+          </a:custGeom>
+          <a:noFill/>
+          <a:ln w="9525">
+            <a:solidFill>
+              <a:schemeClr val="tx1"/>
+            </a:solidFill>
+            <a:headEnd type="arrow"/>
+            <a:tailEnd type="none"/>
+          </a:ln>
+        </p:spPr>
+        <p:style>
+          <a:lnRef idx="2">
+            <a:schemeClr val="accent1">
+              <a:shade val="15000"/>
+            </a:schemeClr>
+          </a:lnRef>
+          <a:fillRef idx="1">
+            <a:schemeClr val="accent1"/>
+          </a:fillRef>
+          <a:effectRef idx="0">
+            <a:schemeClr val="accent1"/>
+          </a:effectRef>
+          <a:fontRef idx="minor">
+            <a:schemeClr val="lt1"/>
+          </a:fontRef>
+        </p:style>
+        <p:txBody>
+          <a:bodyPr rtlCol="0" anchor="ctr"/>
+          <a:lstStyle/>
+          <a:p>
+            <a:pPr algn="ctr"/>
+            <a:endParaRPr lang="de-DE"/>
+          </a:p>
+        </p:txBody>
+      </p:sp>
+      <p:sp>
+        <p:nvSpPr>
+          <p:cNvPr id="30" name="TextBox 29">
+            <a:extLst>
+              <a:ext uri="{FF2B5EF4-FFF2-40B4-BE49-F238E27FC236}">
+                <a16:creationId xmlns:a16="http://schemas.microsoft.com/office/drawing/2014/main" id="{F6C6D485-4972-BEA7-A5D1-5EB4613923B7}"/>
+              </a:ext>
+            </a:extLst>
+          </p:cNvPr>
+          <p:cNvSpPr txBox="1"/>
+          <p:nvPr/>
+        </p:nvSpPr>
+        <p:spPr>
+          <a:xfrm>
+            <a:off x="4216007" y="3417052"/>
+            <a:ext cx="1179591" cy="215444"/>
+          </a:xfrm>
+          <a:prstGeom prst="rect">
+            <a:avLst/>
+          </a:prstGeom>
+          <a:noFill/>
+        </p:spPr>
+        <p:txBody>
+          <a:bodyPr wrap="square" rtlCol="0">
+            <a:spAutoFit/>
+          </a:bodyPr>
+          <a:lstStyle/>
+          <a:p>
+            <a:r>
+              <a:rPr lang="de-DE" sz="800" dirty="0"/>
+              <a:t>-0.02 z-offset </a:t>
+            </a:r>
+            <a:r>
+              <a:rPr lang="de-DE" sz="800" dirty="0" err="1"/>
+              <a:t>of</a:t>
+            </a:r>
+            <a:r>
+              <a:rPr lang="de-DE" sz="800" dirty="0"/>
+              <a:t> </a:t>
+            </a:r>
+            <a:r>
+              <a:rPr lang="de-DE" sz="800" dirty="0" err="1"/>
+              <a:t>table</a:t>
+            </a:r>
+            <a:endParaRPr lang="de-DE" sz="800" dirty="0"/>
+          </a:p>
+        </p:txBody>
+      </p:sp>
+      <p:sp>
+        <p:nvSpPr>
+          <p:cNvPr id="31" name="Textfeld 18">
+            <a:extLst>
+              <a:ext uri="{FF2B5EF4-FFF2-40B4-BE49-F238E27FC236}">
+                <a16:creationId xmlns:a16="http://schemas.microsoft.com/office/drawing/2014/main" id="{4EA86B0E-3B72-A815-CE47-FF275085EE07}"/>
+              </a:ext>
+            </a:extLst>
+          </p:cNvPr>
+          <p:cNvSpPr txBox="1"/>
+          <p:nvPr/>
+        </p:nvSpPr>
+        <p:spPr>
+          <a:xfrm>
+            <a:off x="3509993" y="4916776"/>
+            <a:ext cx="2489774" cy="430887"/>
+          </a:xfrm>
+          <a:prstGeom prst="rect">
+            <a:avLst/>
+          </a:prstGeom>
+          <a:solidFill>
+            <a:schemeClr val="bg1">
+              <a:lumMod val="75000"/>
+            </a:schemeClr>
+          </a:solidFill>
+        </p:spPr>
+        <p:txBody>
+          <a:bodyPr rot="0" spcFirstLastPara="0" vertOverflow="overflow" horzOverflow="overflow" vert="horz" wrap="square" lIns="91440" tIns="45720" rIns="91440" bIns="45720" numCol="1" spcCol="0" rtlCol="0" fromWordArt="0" anchor="t" anchorCtr="0" forceAA="0" compatLnSpc="1">
+            <a:prstTxWarp prst="textNoShape">
+              <a:avLst/>
+            </a:prstTxWarp>
+            <a:spAutoFit/>
+          </a:bodyPr>
+          <a:lstStyle/>
+          <a:p>
+            <a:r>
+              <a:rPr lang="de-DE" sz="1100" b="1" dirty="0" err="1"/>
+              <a:t>pos</a:t>
+            </a:r>
+            <a:r>
+              <a:rPr lang="de-DE" sz="1100" b="1" dirty="0"/>
+              <a:t> = (0.5, -0.5, 0.1-0.02) </a:t>
+            </a:r>
+            <a:r>
+              <a:rPr lang="de-DE" sz="1100" dirty="0"/>
+              <a:t>(</a:t>
+            </a:r>
+            <a:r>
+              <a:rPr lang="de-DE" sz="1100" dirty="0" err="1"/>
+              <a:t>inside</a:t>
+            </a:r>
+            <a:r>
+              <a:rPr lang="de-DE" sz="1100" dirty="0"/>
+              <a:t> Box)</a:t>
+            </a:r>
+          </a:p>
+          <a:p>
+            <a:r>
+              <a:rPr lang="de-DE" sz="1100" b="1" dirty="0" err="1"/>
+              <a:t>size</a:t>
+            </a:r>
+            <a:r>
+              <a:rPr lang="de-DE" sz="1100" b="1" dirty="0"/>
+              <a:t> = (0.1, 0.1, 0.1)</a:t>
+            </a:r>
+          </a:p>
+        </p:txBody>
+      </p:sp>
+      <p:cxnSp>
+        <p:nvCxnSpPr>
+          <p:cNvPr id="33" name="Straight Arrow Connector 32">
+            <a:extLst>
+              <a:ext uri="{FF2B5EF4-FFF2-40B4-BE49-F238E27FC236}">
+                <a16:creationId xmlns:a16="http://schemas.microsoft.com/office/drawing/2014/main" id="{3C82A5DC-19FF-C83E-994F-98538F3092C4}"/>
+              </a:ext>
+            </a:extLst>
+          </p:cNvPr>
+          <p:cNvCxnSpPr/>
+          <p:nvPr/>
+        </p:nvCxnSpPr>
+        <p:spPr>
+          <a:xfrm flipH="1" flipV="1">
+            <a:off x="3249168" y="4242816"/>
+            <a:ext cx="91440" cy="591312"/>
+          </a:xfrm>
+          <a:prstGeom prst="straightConnector1">
+            <a:avLst/>
+          </a:prstGeom>
+          <a:ln>
+            <a:solidFill>
+              <a:schemeClr val="tx1"/>
+            </a:solidFill>
+            <a:headEnd type="triangle"/>
+            <a:tailEnd type="triangle"/>
+          </a:ln>
+        </p:spPr>
+        <p:style>
+          <a:lnRef idx="2">
+            <a:schemeClr val="accent1"/>
+          </a:lnRef>
+          <a:fillRef idx="0">
+            <a:schemeClr val="accent1"/>
+          </a:fillRef>
+          <a:effectRef idx="1">
+            <a:schemeClr val="accent1"/>
+          </a:effectRef>
+          <a:fontRef idx="minor">
+            <a:schemeClr val="tx1"/>
+          </a:fontRef>
+        </p:style>
+      </p:cxnSp>
+      <p:cxnSp>
+        <p:nvCxnSpPr>
+          <p:cNvPr id="34" name="Straight Arrow Connector 33">
+            <a:extLst>
+              <a:ext uri="{FF2B5EF4-FFF2-40B4-BE49-F238E27FC236}">
+                <a16:creationId xmlns:a16="http://schemas.microsoft.com/office/drawing/2014/main" id="{A1DA710D-7725-F48C-2705-C9B859F6B72B}"/>
+              </a:ext>
+            </a:extLst>
+          </p:cNvPr>
+          <p:cNvCxnSpPr>
+            <a:cxnSpLocks/>
+          </p:cNvCxnSpPr>
+          <p:nvPr/>
+        </p:nvCxnSpPr>
+        <p:spPr>
+          <a:xfrm flipV="1">
+            <a:off x="3249168" y="3788834"/>
+            <a:ext cx="182138" cy="453982"/>
+          </a:xfrm>
+          <a:prstGeom prst="straightConnector1">
+            <a:avLst/>
+          </a:prstGeom>
+          <a:ln>
+            <a:solidFill>
+              <a:schemeClr val="tx1"/>
+            </a:solidFill>
+            <a:headEnd type="triangle"/>
+            <a:tailEnd type="triangle"/>
+          </a:ln>
+        </p:spPr>
+        <p:style>
+          <a:lnRef idx="2">
+            <a:schemeClr val="accent1"/>
+          </a:lnRef>
+          <a:fillRef idx="0">
+            <a:schemeClr val="accent1"/>
+          </a:fillRef>
+          <a:effectRef idx="1">
+            <a:schemeClr val="accent1"/>
+          </a:effectRef>
+          <a:fontRef idx="minor">
+            <a:schemeClr val="tx1"/>
+          </a:fontRef>
+        </p:style>
+      </p:cxnSp>
+      <p:sp>
+        <p:nvSpPr>
+          <p:cNvPr id="38" name="TextBox 37">
+            <a:extLst>
+              <a:ext uri="{FF2B5EF4-FFF2-40B4-BE49-F238E27FC236}">
+                <a16:creationId xmlns:a16="http://schemas.microsoft.com/office/drawing/2014/main" id="{02F495F3-05FA-7204-63D1-789E7755D945}"/>
+              </a:ext>
+            </a:extLst>
+          </p:cNvPr>
+          <p:cNvSpPr txBox="1"/>
+          <p:nvPr/>
+        </p:nvSpPr>
+        <p:spPr>
+          <a:xfrm>
+            <a:off x="3010584" y="3865106"/>
+            <a:ext cx="359394" cy="246221"/>
+          </a:xfrm>
+          <a:prstGeom prst="rect">
+            <a:avLst/>
+          </a:prstGeom>
+          <a:noFill/>
+        </p:spPr>
+        <p:txBody>
+          <a:bodyPr wrap="none" rtlCol="0">
+            <a:spAutoFit/>
+          </a:bodyPr>
+          <a:lstStyle/>
+          <a:p>
+            <a:r>
+              <a:rPr lang="de-DE" sz="1000" dirty="0"/>
+              <a:t>0.2</a:t>
+            </a:r>
+          </a:p>
+        </p:txBody>
+      </p:sp>
+      <p:sp>
+        <p:nvSpPr>
+          <p:cNvPr id="39" name="TextBox 38">
+            <a:extLst>
+              <a:ext uri="{FF2B5EF4-FFF2-40B4-BE49-F238E27FC236}">
+                <a16:creationId xmlns:a16="http://schemas.microsoft.com/office/drawing/2014/main" id="{6E7B069B-68BB-6F94-2C3E-C0904C392768}"/>
+              </a:ext>
+            </a:extLst>
+          </p:cNvPr>
+          <p:cNvSpPr txBox="1"/>
+          <p:nvPr/>
+        </p:nvSpPr>
+        <p:spPr>
+          <a:xfrm>
+            <a:off x="3010584" y="4415361"/>
+            <a:ext cx="359394" cy="246221"/>
+          </a:xfrm>
+          <a:prstGeom prst="rect">
+            <a:avLst/>
+          </a:prstGeom>
+          <a:noFill/>
+        </p:spPr>
+        <p:txBody>
+          <a:bodyPr wrap="none" rtlCol="0">
+            <a:spAutoFit/>
+          </a:bodyPr>
+          <a:lstStyle/>
+          <a:p>
+            <a:r>
+              <a:rPr lang="de-DE" sz="1000" dirty="0"/>
+              <a:t>0.2</a:t>
+            </a:r>
+          </a:p>
+        </p:txBody>
+      </p:sp>
+      <p:sp>
+        <p:nvSpPr>
+          <p:cNvPr id="40" name="Oval 39">
+            <a:extLst>
+              <a:ext uri="{FF2B5EF4-FFF2-40B4-BE49-F238E27FC236}">
+                <a16:creationId xmlns:a16="http://schemas.microsoft.com/office/drawing/2014/main" id="{3BA6BD3B-8210-BC4C-835D-431597D11D03}"/>
+              </a:ext>
+            </a:extLst>
+          </p:cNvPr>
+          <p:cNvSpPr/>
+          <p:nvPr/>
+        </p:nvSpPr>
+        <p:spPr>
+          <a:xfrm>
+            <a:off x="3712464" y="4352980"/>
+            <a:ext cx="118118" cy="124761"/>
+          </a:xfrm>
+          <a:prstGeom prst="ellipse">
+            <a:avLst/>
+          </a:prstGeom>
+          <a:solidFill>
+            <a:schemeClr val="tx1"/>
+          </a:solidFill>
+        </p:spPr>
+        <p:style>
+          <a:lnRef idx="2">
+            <a:schemeClr val="accent1">
+              <a:shade val="15000"/>
+            </a:schemeClr>
+          </a:lnRef>
+          <a:fillRef idx="1">
+            <a:schemeClr val="accent1"/>
+          </a:fillRef>
+          <a:effectRef idx="0">
+            <a:schemeClr val="accent1"/>
+          </a:effectRef>
+          <a:fontRef idx="minor">
+            <a:schemeClr val="lt1"/>
+          </a:fontRef>
+        </p:style>
+        <p:txBody>
+          <a:bodyPr rtlCol="0" anchor="ctr"/>
+          <a:lstStyle/>
+          <a:p>
+            <a:pPr algn="ctr"/>
+            <a:endParaRPr lang="de-DE"/>
+          </a:p>
+        </p:txBody>
+      </p:sp>
+      <p:cxnSp>
+        <p:nvCxnSpPr>
+          <p:cNvPr id="46" name="Straight Arrow Connector 45">
+            <a:extLst>
+              <a:ext uri="{FF2B5EF4-FFF2-40B4-BE49-F238E27FC236}">
+                <a16:creationId xmlns:a16="http://schemas.microsoft.com/office/drawing/2014/main" id="{87A58EE2-C1BF-1E17-3848-DF9DDCEF559A}"/>
+              </a:ext>
+            </a:extLst>
+          </p:cNvPr>
+          <p:cNvCxnSpPr>
+            <a:cxnSpLocks/>
+          </p:cNvCxnSpPr>
+          <p:nvPr/>
+        </p:nvCxnSpPr>
+        <p:spPr>
+          <a:xfrm flipH="1" flipV="1">
+            <a:off x="3771523" y="4538471"/>
+            <a:ext cx="136013" cy="475483"/>
+          </a:xfrm>
+          <a:prstGeom prst="straightConnector1">
+            <a:avLst/>
+          </a:prstGeom>
+          <a:ln w="9525">
+            <a:solidFill>
+              <a:schemeClr val="tx1"/>
+            </a:solidFill>
+            <a:tailEnd type="arrow"/>
+          </a:ln>
+        </p:spPr>
+        <p:style>
+          <a:lnRef idx="2">
+            <a:schemeClr val="accent1"/>
+          </a:lnRef>
+          <a:fillRef idx="0">
+            <a:schemeClr val="accent1"/>
+          </a:fillRef>
+          <a:effectRef idx="1">
+            <a:schemeClr val="accent1"/>
+          </a:effectRef>
+          <a:fontRef idx="minor">
+            <a:schemeClr val="tx1"/>
+          </a:fontRef>
+        </p:style>
+      </p:cxnSp>
+      <p:sp>
+        <p:nvSpPr>
+          <p:cNvPr id="49" name="Oval 48">
+            <a:extLst>
+              <a:ext uri="{FF2B5EF4-FFF2-40B4-BE49-F238E27FC236}">
+                <a16:creationId xmlns:a16="http://schemas.microsoft.com/office/drawing/2014/main" id="{98499344-AFFE-38F7-DE7F-4F03F02B211D}"/>
+              </a:ext>
+            </a:extLst>
+          </p:cNvPr>
+          <p:cNvSpPr/>
+          <p:nvPr/>
+        </p:nvSpPr>
+        <p:spPr>
+          <a:xfrm>
+            <a:off x="4194429" y="4255802"/>
+            <a:ext cx="118118" cy="124761"/>
+          </a:xfrm>
+          <a:prstGeom prst="ellipse">
+            <a:avLst/>
+          </a:prstGeom>
+          <a:solidFill>
+            <a:schemeClr val="accent5"/>
+          </a:solidFill>
+          <a:ln>
+            <a:noFill/>
+          </a:ln>
+        </p:spPr>
+        <p:style>
+          <a:lnRef idx="2">
+            <a:schemeClr val="accent1">
+              <a:shade val="15000"/>
+            </a:schemeClr>
+          </a:lnRef>
+          <a:fillRef idx="1">
+            <a:schemeClr val="accent1"/>
+          </a:fillRef>
+          <a:effectRef idx="0">
+            <a:schemeClr val="accent1"/>
+          </a:effectRef>
+          <a:fontRef idx="minor">
+            <a:schemeClr val="lt1"/>
+          </a:fontRef>
+        </p:style>
+        <p:txBody>
+          <a:bodyPr rtlCol="0" anchor="ctr"/>
+          <a:lstStyle/>
+          <a:p>
+            <a:pPr algn="ctr"/>
+            <a:endParaRPr lang="de-DE"/>
+          </a:p>
+        </p:txBody>
+      </p:sp>
+      <p:sp>
+        <p:nvSpPr>
+          <p:cNvPr id="50" name="TextBox 49">
+            <a:extLst>
+              <a:ext uri="{FF2B5EF4-FFF2-40B4-BE49-F238E27FC236}">
+                <a16:creationId xmlns:a16="http://schemas.microsoft.com/office/drawing/2014/main" id="{3BCC1177-F085-F007-7943-22DCA663DED9}"/>
+              </a:ext>
+            </a:extLst>
+          </p:cNvPr>
+          <p:cNvSpPr txBox="1"/>
+          <p:nvPr/>
+        </p:nvSpPr>
+        <p:spPr>
+          <a:xfrm>
+            <a:off x="4223225" y="4208738"/>
+            <a:ext cx="1149674" cy="261610"/>
+          </a:xfrm>
+          <a:prstGeom prst="rect">
+            <a:avLst/>
+          </a:prstGeom>
+          <a:noFill/>
+        </p:spPr>
+        <p:txBody>
+          <a:bodyPr wrap="none" rtlCol="0">
+            <a:spAutoFit/>
+          </a:bodyPr>
+          <a:lstStyle/>
+          <a:p>
+            <a:r>
+              <a:rPr lang="de-DE" sz="1050" dirty="0">
+                <a:solidFill>
+                  <a:schemeClr val="accent5">
+                    <a:lumMod val="75000"/>
+                  </a:schemeClr>
+                </a:solidFill>
+              </a:rPr>
+              <a:t>(0.4, -0.4, -0.02)</a:t>
+            </a:r>
+          </a:p>
+        </p:txBody>
+      </p:sp>
+      <p:sp>
+        <p:nvSpPr>
+          <p:cNvPr id="56" name="Freeform: Shape 55">
+            <a:extLst>
+              <a:ext uri="{FF2B5EF4-FFF2-40B4-BE49-F238E27FC236}">
+                <a16:creationId xmlns:a16="http://schemas.microsoft.com/office/drawing/2014/main" id="{A8C11222-2014-C5A9-C99B-09D7E66B935A}"/>
+              </a:ext>
+            </a:extLst>
+          </p:cNvPr>
+          <p:cNvSpPr/>
+          <p:nvPr/>
+        </p:nvSpPr>
+        <p:spPr>
+          <a:xfrm>
+            <a:off x="3121005" y="4619470"/>
+            <a:ext cx="457347" cy="598706"/>
+          </a:xfrm>
+          <a:custGeom>
+            <a:avLst/>
+            <a:gdLst>
+              <a:gd name="connsiteX0" fmla="*/ 457347 w 457347"/>
+              <a:gd name="connsiteY0" fmla="*/ 530352 h 530352"/>
+              <a:gd name="connsiteX1" fmla="*/ 55011 w 457347"/>
+              <a:gd name="connsiteY1" fmla="*/ 384048 h 530352"/>
+              <a:gd name="connsiteX2" fmla="*/ 6243 w 457347"/>
+              <a:gd name="connsiteY2" fmla="*/ 0 h 530352"/>
+            </a:gdLst>
+            <a:ahLst/>
+            <a:cxnLst>
+              <a:cxn ang="0">
+                <a:pos x="connsiteX0" y="connsiteY0"/>
+              </a:cxn>
+              <a:cxn ang="0">
+                <a:pos x="connsiteX1" y="connsiteY1"/>
+              </a:cxn>
+              <a:cxn ang="0">
+                <a:pos x="connsiteX2" y="connsiteY2"/>
+              </a:cxn>
+            </a:cxnLst>
+            <a:rect l="l" t="t" r="r" b="b"/>
+            <a:pathLst>
+              <a:path w="457347" h="530352">
+                <a:moveTo>
+                  <a:pt x="457347" y="530352"/>
+                </a:moveTo>
+                <a:cubicBezTo>
+                  <a:pt x="293771" y="501396"/>
+                  <a:pt x="130195" y="472440"/>
+                  <a:pt x="55011" y="384048"/>
+                </a:cubicBezTo>
+                <a:cubicBezTo>
+                  <a:pt x="-20173" y="295656"/>
+                  <a:pt x="2179" y="61976"/>
+                  <a:pt x="6243" y="0"/>
+                </a:cubicBezTo>
+              </a:path>
+            </a:pathLst>
+          </a:custGeom>
+          <a:noFill/>
+          <a:ln w="3175">
+            <a:solidFill>
+              <a:schemeClr val="tx1"/>
+            </a:solidFill>
+            <a:tailEnd type="arrow"/>
+          </a:ln>
+        </p:spPr>
+        <p:style>
+          <a:lnRef idx="2">
+            <a:schemeClr val="accent1">
+              <a:shade val="15000"/>
+            </a:schemeClr>
+          </a:lnRef>
+          <a:fillRef idx="1">
+            <a:schemeClr val="accent1"/>
+          </a:fillRef>
+          <a:effectRef idx="0">
+            <a:schemeClr val="accent1"/>
+          </a:effectRef>
+          <a:fontRef idx="minor">
+            <a:schemeClr val="lt1"/>
+          </a:fontRef>
+        </p:style>
+        <p:txBody>
+          <a:bodyPr rtlCol="0" anchor="ctr"/>
+          <a:lstStyle/>
+          <a:p>
+            <a:pPr algn="ctr"/>
+            <a:endParaRPr lang="de-DE"/>
           </a:p>
         </p:txBody>
       </p:sp>
     </p:spTree>
     <p:extLst>
       <p:ext uri="{BB962C8B-B14F-4D97-AF65-F5344CB8AC3E}">
-        <p14:creationId xmlns:p14="http://schemas.microsoft.com/office/powerpoint/2010/main" val="1577499883"/>
+        <p14:creationId xmlns:p14="http://schemas.microsoft.com/office/powerpoint/2010/main" val="283367085"/>
       </p:ext>
     </p:extLst>
   </p:cSld>

</xml_diff>

<commit_message>
fixed axes in image pf gripper kos
</commit_message>
<xml_diff>
--- a/assets/ccordinate_systems.pptx
+++ b/assets/ccordinate_systems.pptx
@@ -3452,7 +3452,7 @@
             <a:pPr algn="l"/>
             <a:r>
               <a:rPr lang="de-DE" sz="1400" b="1" dirty="0"/>
-              <a:t>y</a:t>
+              <a:t>x</a:t>
             </a:r>
             <a:endParaRPr lang="de-DE" b="1" dirty="0"/>
           </a:p>
@@ -3492,7 +3492,7 @@
             <a:pPr algn="l"/>
             <a:r>
               <a:rPr lang="de-DE" sz="1400" b="1" dirty="0"/>
-              <a:t>x</a:t>
+              <a:t>y</a:t>
             </a:r>
           </a:p>
         </p:txBody>

</xml_diff>

<commit_message>
correcting coordinate system image again
</commit_message>
<xml_diff>
--- a/assets/ccordinate_systems.pptx
+++ b/assets/ccordinate_systems.pptx
@@ -3013,8 +3013,8 @@
         </p:nvCxnSpPr>
         <p:spPr>
           <a:xfrm flipH="1">
-            <a:off x="5517269" y="3639274"/>
-            <a:ext cx="71370" cy="799561"/>
+            <a:off x="5534215" y="3639274"/>
+            <a:ext cx="54424" cy="776086"/>
           </a:xfrm>
           <a:prstGeom prst="straightConnector1">
             <a:avLst/>
@@ -3221,7 +3221,7 @@
         </p:nvSpPr>
         <p:spPr>
           <a:xfrm>
-            <a:off x="5234398" y="4170790"/>
+            <a:off x="5562985" y="4133516"/>
             <a:ext cx="405113" cy="369332"/>
           </a:xfrm>
           <a:prstGeom prst="rect">
@@ -3246,50 +3246,6 @@
           </a:p>
         </p:txBody>
       </p:sp>
-      <p:cxnSp>
-        <p:nvCxnSpPr>
-          <p:cNvPr id="11" name="Gerade Verbindung mit Pfeil 10">
-            <a:extLst>
-              <a:ext uri="{FF2B5EF4-FFF2-40B4-BE49-F238E27FC236}">
-                <a16:creationId xmlns:a16="http://schemas.microsoft.com/office/drawing/2014/main" id="{726D55A2-9031-E46C-009A-64CF76A06D83}"/>
-              </a:ext>
-            </a:extLst>
-          </p:cNvPr>
-          <p:cNvCxnSpPr>
-            <a:cxnSpLocks/>
-          </p:cNvCxnSpPr>
-          <p:nvPr/>
-        </p:nvCxnSpPr>
-        <p:spPr>
-          <a:xfrm flipH="1">
-            <a:off x="6948670" y="3068980"/>
-            <a:ext cx="513142" cy="422475"/>
-          </a:xfrm>
-          <a:prstGeom prst="straightConnector1">
-            <a:avLst/>
-          </a:prstGeom>
-          <a:ln w="25400">
-            <a:solidFill>
-              <a:srgbClr val="FF0000"/>
-            </a:solidFill>
-            <a:tailEnd type="triangle"/>
-          </a:ln>
-        </p:spPr>
-        <p:style>
-          <a:lnRef idx="2">
-            <a:schemeClr val="accent1"/>
-          </a:lnRef>
-          <a:fillRef idx="0">
-            <a:schemeClr val="accent1"/>
-          </a:fillRef>
-          <a:effectRef idx="1">
-            <a:schemeClr val="accent1"/>
-          </a:effectRef>
-          <a:fontRef idx="minor">
-            <a:schemeClr val="tx1"/>
-          </a:fontRef>
-        </p:style>
-      </p:cxnSp>
       <p:cxnSp>
         <p:nvCxnSpPr>
           <p:cNvPr id="12" name="Gerade Verbindung mit Pfeil 11">
@@ -3306,8 +3262,8 @@
         </p:nvCxnSpPr>
         <p:spPr>
           <a:xfrm flipH="1">
-            <a:off x="7450238" y="3068980"/>
-            <a:ext cx="11574" cy="682905"/>
+            <a:off x="7369798" y="3068980"/>
+            <a:ext cx="92014" cy="719854"/>
           </a:xfrm>
           <a:prstGeom prst="straightConnector1">
             <a:avLst/>
@@ -3392,7 +3348,7 @@
         </p:nvSpPr>
         <p:spPr>
           <a:xfrm>
-            <a:off x="7299553" y="3659672"/>
+            <a:off x="7218424" y="3745809"/>
             <a:ext cx="405113" cy="307777"/>
           </a:xfrm>
           <a:prstGeom prst="rect">
@@ -3432,7 +3388,7 @@
         </p:nvSpPr>
         <p:spPr>
           <a:xfrm>
-            <a:off x="6787484" y="3376477"/>
+            <a:off x="7450701" y="3603669"/>
             <a:ext cx="405113" cy="307777"/>
           </a:xfrm>
           <a:prstGeom prst="rect">
@@ -4200,6 +4156,50 @@
           </a:p>
         </p:txBody>
       </p:sp>
+      <p:cxnSp>
+        <p:nvCxnSpPr>
+          <p:cNvPr id="11" name="Gerade Verbindung mit Pfeil 10">
+            <a:extLst>
+              <a:ext uri="{FF2B5EF4-FFF2-40B4-BE49-F238E27FC236}">
+                <a16:creationId xmlns:a16="http://schemas.microsoft.com/office/drawing/2014/main" id="{726D55A2-9031-E46C-009A-64CF76A06D83}"/>
+              </a:ext>
+            </a:extLst>
+          </p:cNvPr>
+          <p:cNvCxnSpPr>
+            <a:cxnSpLocks/>
+          </p:cNvCxnSpPr>
+          <p:nvPr/>
+        </p:nvCxnSpPr>
+        <p:spPr>
+          <a:xfrm>
+            <a:off x="7457928" y="3080136"/>
+            <a:ext cx="76434" cy="613721"/>
+          </a:xfrm>
+          <a:prstGeom prst="straightConnector1">
+            <a:avLst/>
+          </a:prstGeom>
+          <a:ln w="25400">
+            <a:solidFill>
+              <a:srgbClr val="FF0000"/>
+            </a:solidFill>
+            <a:tailEnd type="triangle"/>
+          </a:ln>
+        </p:spPr>
+        <p:style>
+          <a:lnRef idx="2">
+            <a:schemeClr val="accent1"/>
+          </a:lnRef>
+          <a:fillRef idx="0">
+            <a:schemeClr val="accent1"/>
+          </a:fillRef>
+          <a:effectRef idx="1">
+            <a:schemeClr val="accent1"/>
+          </a:effectRef>
+          <a:fontRef idx="minor">
+            <a:schemeClr val="tx1"/>
+          </a:fontRef>
+        </p:style>
+      </p:cxnSp>
     </p:spTree>
     <p:extLst>
       <p:ext uri="{BB962C8B-B14F-4D97-AF65-F5344CB8AC3E}">

</xml_diff>